<commit_message>
added notes to section 4 of draft proposal
</commit_message>
<xml_diff>
--- a/Architecture.pptx
+++ b/Architecture.pptx
@@ -104,6 +104,11 @@
       </a:defRPr>
     </a:lvl9pPr>
   </p:defaultTextStyle>
+  <p:extLst>
+    <p:ext uri="{EFAFB233-063F-42B5-8137-9DF3F51BA10A}">
+      <p15:sldGuideLst xmlns:p15="http://schemas.microsoft.com/office/powerpoint/2012/main"/>
+    </p:ext>
+  </p:extLst>
 </p:presentation>
 </file>
 
@@ -256,7 +261,7 @@
           <a:p>
             <a:fld id="{C3E7F28E-B87E-43C3-AFD2-AB5F5FEAA12B}" type="datetimeFigureOut">
               <a:rPr lang="en-CA" smtClean="0"/>
-              <a:t>2020-07-30</a:t>
+              <a:t>2020-08-09</a:t>
             </a:fld>
             <a:endParaRPr lang="en-CA"/>
           </a:p>
@@ -456,7 +461,7 @@
           <a:p>
             <a:fld id="{C3E7F28E-B87E-43C3-AFD2-AB5F5FEAA12B}" type="datetimeFigureOut">
               <a:rPr lang="en-CA" smtClean="0"/>
-              <a:t>2020-07-30</a:t>
+              <a:t>2020-08-09</a:t>
             </a:fld>
             <a:endParaRPr lang="en-CA"/>
           </a:p>
@@ -666,7 +671,7 @@
           <a:p>
             <a:fld id="{C3E7F28E-B87E-43C3-AFD2-AB5F5FEAA12B}" type="datetimeFigureOut">
               <a:rPr lang="en-CA" smtClean="0"/>
-              <a:t>2020-07-30</a:t>
+              <a:t>2020-08-09</a:t>
             </a:fld>
             <a:endParaRPr lang="en-CA"/>
           </a:p>
@@ -866,7 +871,7 @@
           <a:p>
             <a:fld id="{C3E7F28E-B87E-43C3-AFD2-AB5F5FEAA12B}" type="datetimeFigureOut">
               <a:rPr lang="en-CA" smtClean="0"/>
-              <a:t>2020-07-30</a:t>
+              <a:t>2020-08-09</a:t>
             </a:fld>
             <a:endParaRPr lang="en-CA"/>
           </a:p>
@@ -1142,7 +1147,7 @@
           <a:p>
             <a:fld id="{C3E7F28E-B87E-43C3-AFD2-AB5F5FEAA12B}" type="datetimeFigureOut">
               <a:rPr lang="en-CA" smtClean="0"/>
-              <a:t>2020-07-30</a:t>
+              <a:t>2020-08-09</a:t>
             </a:fld>
             <a:endParaRPr lang="en-CA"/>
           </a:p>
@@ -1410,7 +1415,7 @@
           <a:p>
             <a:fld id="{C3E7F28E-B87E-43C3-AFD2-AB5F5FEAA12B}" type="datetimeFigureOut">
               <a:rPr lang="en-CA" smtClean="0"/>
-              <a:t>2020-07-30</a:t>
+              <a:t>2020-08-09</a:t>
             </a:fld>
             <a:endParaRPr lang="en-CA"/>
           </a:p>
@@ -1825,7 +1830,7 @@
           <a:p>
             <a:fld id="{C3E7F28E-B87E-43C3-AFD2-AB5F5FEAA12B}" type="datetimeFigureOut">
               <a:rPr lang="en-CA" smtClean="0"/>
-              <a:t>2020-07-30</a:t>
+              <a:t>2020-08-09</a:t>
             </a:fld>
             <a:endParaRPr lang="en-CA"/>
           </a:p>
@@ -1967,7 +1972,7 @@
           <a:p>
             <a:fld id="{C3E7F28E-B87E-43C3-AFD2-AB5F5FEAA12B}" type="datetimeFigureOut">
               <a:rPr lang="en-CA" smtClean="0"/>
-              <a:t>2020-07-30</a:t>
+              <a:t>2020-08-09</a:t>
             </a:fld>
             <a:endParaRPr lang="en-CA"/>
           </a:p>
@@ -2080,7 +2085,7 @@
           <a:p>
             <a:fld id="{C3E7F28E-B87E-43C3-AFD2-AB5F5FEAA12B}" type="datetimeFigureOut">
               <a:rPr lang="en-CA" smtClean="0"/>
-              <a:t>2020-07-30</a:t>
+              <a:t>2020-08-09</a:t>
             </a:fld>
             <a:endParaRPr lang="en-CA"/>
           </a:p>
@@ -2393,7 +2398,7 @@
           <a:p>
             <a:fld id="{C3E7F28E-B87E-43C3-AFD2-AB5F5FEAA12B}" type="datetimeFigureOut">
               <a:rPr lang="en-CA" smtClean="0"/>
-              <a:t>2020-07-30</a:t>
+              <a:t>2020-08-09</a:t>
             </a:fld>
             <a:endParaRPr lang="en-CA"/>
           </a:p>
@@ -2682,7 +2687,7 @@
           <a:p>
             <a:fld id="{C3E7F28E-B87E-43C3-AFD2-AB5F5FEAA12B}" type="datetimeFigureOut">
               <a:rPr lang="en-CA" smtClean="0"/>
-              <a:t>2020-07-30</a:t>
+              <a:t>2020-08-09</a:t>
             </a:fld>
             <a:endParaRPr lang="en-CA"/>
           </a:p>
@@ -2925,7 +2930,7 @@
           <a:p>
             <a:fld id="{C3E7F28E-B87E-43C3-AFD2-AB5F5FEAA12B}" type="datetimeFigureOut">
               <a:rPr lang="en-CA" smtClean="0"/>
-              <a:t>2020-07-30</a:t>
+              <a:t>2020-08-09</a:t>
             </a:fld>
             <a:endParaRPr lang="en-CA"/>
           </a:p>
@@ -3369,7 +3374,7 @@
         </p:blipFill>
         <p:spPr bwMode="auto">
           <a:xfrm>
-            <a:off x="634584" y="957941"/>
+            <a:off x="1618652" y="941587"/>
             <a:ext cx="697074" cy="720000"/>
           </a:xfrm>
           <a:prstGeom prst="rect">
@@ -3401,7 +3406,7 @@
         </p:nvSpPr>
         <p:spPr>
           <a:xfrm>
-            <a:off x="634584" y="1636022"/>
+            <a:off x="1618652" y="1619668"/>
             <a:ext cx="681784" cy="369332"/>
           </a:xfrm>
           <a:prstGeom prst="rect">
@@ -3424,12 +3429,49 @@
           </a:p>
         </p:txBody>
       </p:sp>
+      <p:sp>
+        <p:nvSpPr>
+          <p:cNvPr id="9" name="TextBox 8">
+            <a:extLst>
+              <a:ext uri="{FF2B5EF4-FFF2-40B4-BE49-F238E27FC236}">
+                <a16:creationId xmlns:a16="http://schemas.microsoft.com/office/drawing/2014/main" id="{6FA02C2F-32DB-4A89-BAE5-832684A2EE48}"/>
+              </a:ext>
+            </a:extLst>
+          </p:cNvPr>
+          <p:cNvSpPr txBox="1"/>
+          <p:nvPr/>
+        </p:nvSpPr>
+        <p:spPr>
+          <a:xfrm>
+            <a:off x="1618652" y="3059668"/>
+            <a:ext cx="681784" cy="369332"/>
+          </a:xfrm>
+          <a:prstGeom prst="rect">
+            <a:avLst/>
+          </a:prstGeom>
+          <a:noFill/>
+        </p:spPr>
+        <p:txBody>
+          <a:bodyPr wrap="square" rtlCol="0">
+            <a:spAutoFit/>
+          </a:bodyPr>
+          <a:lstStyle/>
+          <a:p>
+            <a:pPr algn="ctr"/>
+            <a:r>
+              <a:rPr lang="en-US" dirty="0"/>
+              <a:t>API</a:t>
+            </a:r>
+            <a:endParaRPr lang="en-CA" dirty="0"/>
+          </a:p>
+        </p:txBody>
+      </p:sp>
       <p:pic>
         <p:nvPicPr>
-          <p:cNvPr id="1030" name="Picture 6">
-            <a:extLst>
-              <a:ext uri="{FF2B5EF4-FFF2-40B4-BE49-F238E27FC236}">
-                <a16:creationId xmlns:a16="http://schemas.microsoft.com/office/drawing/2014/main" id="{CD18212C-6A1B-4334-9138-EB40C84603F0}"/>
+          <p:cNvPr id="1032" name="Picture 8" descr="How to Evaluate AWS RDS Pricing and Features - ParkMyCloud">
+            <a:extLst>
+              <a:ext uri="{FF2B5EF4-FFF2-40B4-BE49-F238E27FC236}">
+                <a16:creationId xmlns:a16="http://schemas.microsoft.com/office/drawing/2014/main" id="{018FFE80-DD80-43DE-A7F6-2950659EB821}"/>
               </a:ext>
             </a:extLst>
           </p:cNvPr>
@@ -3453,91 +3495,7 @@
         </p:blipFill>
         <p:spPr bwMode="auto">
           <a:xfrm>
-            <a:off x="634584" y="2356022"/>
-            <a:ext cx="720000" cy="720000"/>
-          </a:xfrm>
-          <a:prstGeom prst="rect">
-            <a:avLst/>
-          </a:prstGeom>
-          <a:noFill/>
-          <a:extLst>
-            <a:ext uri="{909E8E84-426E-40DD-AFC4-6F175D3DCCD1}">
-              <a14:hiddenFill xmlns:a14="http://schemas.microsoft.com/office/drawing/2010/main">
-                <a:solidFill>
-                  <a:srgbClr val="FFFFFF"/>
-                </a:solidFill>
-              </a14:hiddenFill>
-            </a:ext>
-          </a:extLst>
-        </p:spPr>
-      </p:pic>
-      <p:sp>
-        <p:nvSpPr>
-          <p:cNvPr id="9" name="TextBox 8">
-            <a:extLst>
-              <a:ext uri="{FF2B5EF4-FFF2-40B4-BE49-F238E27FC236}">
-                <a16:creationId xmlns:a16="http://schemas.microsoft.com/office/drawing/2014/main" id="{6FA02C2F-32DB-4A89-BAE5-832684A2EE48}"/>
-              </a:ext>
-            </a:extLst>
-          </p:cNvPr>
-          <p:cNvSpPr txBox="1"/>
-          <p:nvPr/>
-        </p:nvSpPr>
-        <p:spPr>
-          <a:xfrm>
-            <a:off x="634584" y="3076022"/>
-            <a:ext cx="681784" cy="369332"/>
-          </a:xfrm>
-          <a:prstGeom prst="rect">
-            <a:avLst/>
-          </a:prstGeom>
-          <a:noFill/>
-        </p:spPr>
-        <p:txBody>
-          <a:bodyPr wrap="square" rtlCol="0">
-            <a:spAutoFit/>
-          </a:bodyPr>
-          <a:lstStyle/>
-          <a:p>
-            <a:pPr algn="ctr"/>
-            <a:r>
-              <a:rPr lang="en-US" dirty="0"/>
-              <a:t>API</a:t>
-            </a:r>
-            <a:endParaRPr lang="en-CA" dirty="0"/>
-          </a:p>
-        </p:txBody>
-      </p:sp>
-      <p:pic>
-        <p:nvPicPr>
-          <p:cNvPr id="1032" name="Picture 8" descr="How to Evaluate AWS RDS Pricing and Features - ParkMyCloud">
-            <a:extLst>
-              <a:ext uri="{FF2B5EF4-FFF2-40B4-BE49-F238E27FC236}">
-                <a16:creationId xmlns:a16="http://schemas.microsoft.com/office/drawing/2014/main" id="{018FFE80-DD80-43DE-A7F6-2950659EB821}"/>
-              </a:ext>
-            </a:extLst>
-          </p:cNvPr>
-          <p:cNvPicPr>
-            <a:picLocks noChangeAspect="1" noChangeArrowheads="1"/>
-          </p:cNvPicPr>
-          <p:nvPr/>
-        </p:nvPicPr>
-        <p:blipFill>
-          <a:blip r:embed="rId4">
-            <a:extLst>
-              <a:ext uri="{28A0092B-C50C-407E-A947-70E740481C1C}">
-                <a14:useLocalDpi xmlns:a14="http://schemas.microsoft.com/office/drawing/2010/main" val="0"/>
-              </a:ext>
-            </a:extLst>
-          </a:blip>
-          <a:srcRect/>
-          <a:stretch>
-            <a:fillRect/>
-          </a:stretch>
-        </p:blipFill>
-        <p:spPr bwMode="auto">
-          <a:xfrm>
-            <a:off x="3436070" y="1677941"/>
+            <a:off x="4420138" y="1661587"/>
             <a:ext cx="1440000" cy="900000"/>
           </a:xfrm>
           <a:prstGeom prst="rect">
@@ -3572,7 +3530,7 @@
         </p:nvCxnSpPr>
         <p:spPr>
           <a:xfrm>
-            <a:off x="1331658" y="1317941"/>
+            <a:off x="2315726" y="1301587"/>
             <a:ext cx="2104412" cy="810000"/>
           </a:xfrm>
           <a:prstGeom prst="bentConnector3">
@@ -3608,14 +3566,13 @@
             </a:extLst>
           </p:cNvPr>
           <p:cNvCxnSpPr>
-            <a:stCxn id="1030" idx="3"/>
             <a:endCxn id="1032" idx="1"/>
           </p:cNvCxnSpPr>
           <p:nvPr/>
         </p:nvCxnSpPr>
         <p:spPr>
           <a:xfrm flipV="1">
-            <a:off x="1354584" y="2127941"/>
+            <a:off x="2338652" y="2111587"/>
             <a:ext cx="2081486" cy="588081"/>
           </a:xfrm>
           <a:prstGeom prst="bentConnector3">
@@ -3656,7 +3613,7 @@
           <p:nvPr/>
         </p:nvPicPr>
         <p:blipFill rotWithShape="1">
-          <a:blip r:embed="rId5">
+          <a:blip r:embed="rId4">
             <a:extLst>
               <a:ext uri="{28A0092B-C50C-407E-A947-70E740481C1C}">
                 <a14:useLocalDpi xmlns:a14="http://schemas.microsoft.com/office/drawing/2010/main" val="0"/>
@@ -3668,7 +3625,7 @@
         </p:blipFill>
         <p:spPr bwMode="auto">
           <a:xfrm>
-            <a:off x="6238885" y="1677941"/>
+            <a:off x="7222953" y="1661587"/>
             <a:ext cx="757015" cy="900000"/>
           </a:xfrm>
           <a:prstGeom prst="rect">
@@ -3703,7 +3660,7 @@
         </p:nvCxnSpPr>
         <p:spPr>
           <a:xfrm>
-            <a:off x="4876070" y="2127941"/>
+            <a:off x="5860138" y="2111587"/>
             <a:ext cx="1362815" cy="0"/>
           </a:xfrm>
           <a:prstGeom prst="straightConnector1">
@@ -3743,7 +3700,7 @@
           <p:nvPr/>
         </p:nvPicPr>
         <p:blipFill rotWithShape="1">
-          <a:blip r:embed="rId6">
+          <a:blip r:embed="rId5">
             <a:extLst>
               <a:ext uri="{28A0092B-C50C-407E-A947-70E740481C1C}">
                 <a14:useLocalDpi xmlns:a14="http://schemas.microsoft.com/office/drawing/2010/main" val="0"/>
@@ -3755,7 +3712,7 @@
         </p:blipFill>
         <p:spPr bwMode="auto">
           <a:xfrm>
-            <a:off x="6043746" y="3265354"/>
+            <a:off x="7027814" y="3249000"/>
             <a:ext cx="1167825" cy="360000"/>
           </a:xfrm>
           <a:prstGeom prst="rect">
@@ -3788,7 +3745,7 @@
           <p:nvPr/>
         </p:nvPicPr>
         <p:blipFill>
-          <a:blip r:embed="rId7">
+          <a:blip r:embed="rId6">
             <a:extLst>
               <a:ext uri="{28A0092B-C50C-407E-A947-70E740481C1C}">
                 <a14:useLocalDpi xmlns:a14="http://schemas.microsoft.com/office/drawing/2010/main" val="0"/>
@@ -3802,7 +3759,7 @@
         </p:blipFill>
         <p:spPr bwMode="auto">
           <a:xfrm>
-            <a:off x="6043744" y="3625354"/>
+            <a:off x="7027812" y="3609000"/>
             <a:ext cx="1080000" cy="437507"/>
           </a:xfrm>
           <a:prstGeom prst="rect">
@@ -3835,7 +3792,7 @@
           <p:nvPr/>
         </p:nvPicPr>
         <p:blipFill>
-          <a:blip r:embed="rId8">
+          <a:blip r:embed="rId7">
             <a:extLst>
               <a:ext uri="{28A0092B-C50C-407E-A947-70E740481C1C}">
                 <a14:useLocalDpi xmlns:a14="http://schemas.microsoft.com/office/drawing/2010/main" val="0"/>
@@ -3849,7 +3806,7 @@
         </p:blipFill>
         <p:spPr bwMode="auto">
           <a:xfrm>
-            <a:off x="6357658" y="4005719"/>
+            <a:off x="7341726" y="3989365"/>
             <a:ext cx="540000" cy="540000"/>
           </a:xfrm>
           <a:prstGeom prst="rect">
@@ -3884,7 +3841,7 @@
         </p:nvCxnSpPr>
         <p:spPr>
           <a:xfrm flipH="1" flipV="1">
-            <a:off x="6617393" y="2577941"/>
+            <a:off x="7601461" y="2561587"/>
             <a:ext cx="10266" cy="687413"/>
           </a:xfrm>
           <a:prstGeom prst="straightConnector1">
@@ -3939,12 +3896,57 @@
           <a:p>
             <a:r>
               <a:rPr lang="en-US" dirty="0"/>
-              <a:t>Proposed Architecture (Draft)</a:t>
+              <a:t>Proposed Architecture</a:t>
             </a:r>
             <a:endParaRPr lang="en-CA" dirty="0"/>
           </a:p>
         </p:txBody>
       </p:sp>
+      <p:pic>
+        <p:nvPicPr>
+          <p:cNvPr id="2" name="Picture 2" descr="government-of-canada-logo – Copy – Quebec Writers' Federation">
+            <a:extLst>
+              <a:ext uri="{FF2B5EF4-FFF2-40B4-BE49-F238E27FC236}">
+                <a16:creationId xmlns:a16="http://schemas.microsoft.com/office/drawing/2014/main" id="{EC8A4AF7-9A25-4F9C-8D11-A14369A02696}"/>
+              </a:ext>
+            </a:extLst>
+          </p:cNvPr>
+          <p:cNvPicPr>
+            <a:picLocks noChangeAspect="1" noChangeArrowheads="1"/>
+          </p:cNvPicPr>
+          <p:nvPr/>
+        </p:nvPicPr>
+        <p:blipFill rotWithShape="1">
+          <a:blip r:embed="rId8">
+            <a:extLst>
+              <a:ext uri="{28A0092B-C50C-407E-A947-70E740481C1C}">
+                <a14:useLocalDpi xmlns:a14="http://schemas.microsoft.com/office/drawing/2010/main" val="0"/>
+              </a:ext>
+            </a:extLst>
+          </a:blip>
+          <a:srcRect l="7812" t="13399" r="11255" b="16512"/>
+          <a:stretch/>
+        </p:blipFill>
+        <p:spPr bwMode="auto">
+          <a:xfrm>
+            <a:off x="879227" y="2353112"/>
+            <a:ext cx="1440000" cy="627937"/>
+          </a:xfrm>
+          <a:prstGeom prst="rect">
+            <a:avLst/>
+          </a:prstGeom>
+          <a:noFill/>
+          <a:extLst>
+            <a:ext uri="{909E8E84-426E-40DD-AFC4-6F175D3DCCD1}">
+              <a14:hiddenFill xmlns:a14="http://schemas.microsoft.com/office/drawing/2010/main">
+                <a:solidFill>
+                  <a:srgbClr val="FFFFFF"/>
+                </a:solidFill>
+              </a14:hiddenFill>
+            </a:ext>
+          </a:extLst>
+        </p:spPr>
+      </p:pic>
     </p:spTree>
     <p:extLst>
       <p:ext uri="{BB962C8B-B14F-4D97-AF65-F5344CB8AC3E}">

</xml_diff>